<commit_message>
Updated visualisations to render the percentage a cell was visited
</commit_message>
<xml_diff>
--- a/Presentations/Findings Presentation/Findings.pptx
+++ b/Presentations/Findings Presentation/Findings.pptx
@@ -267,7 +267,7 @@
           <a:p>
             <a:fld id="{C63CCCAA-046B-4FA1-910A-554349CB7EF0}" type="datetimeFigureOut">
               <a:rPr lang="en-GB" smtClean="0"/>
-              <a:t>08/03/2018</a:t>
+              <a:t>11/03/2018</a:t>
             </a:fld>
             <a:endParaRPr lang="en-GB"/>
           </a:p>
@@ -467,7 +467,7 @@
           <a:p>
             <a:fld id="{C63CCCAA-046B-4FA1-910A-554349CB7EF0}" type="datetimeFigureOut">
               <a:rPr lang="en-GB" smtClean="0"/>
-              <a:t>08/03/2018</a:t>
+              <a:t>11/03/2018</a:t>
             </a:fld>
             <a:endParaRPr lang="en-GB"/>
           </a:p>
@@ -677,7 +677,7 @@
           <a:p>
             <a:fld id="{C63CCCAA-046B-4FA1-910A-554349CB7EF0}" type="datetimeFigureOut">
               <a:rPr lang="en-GB" smtClean="0"/>
-              <a:t>08/03/2018</a:t>
+              <a:t>11/03/2018</a:t>
             </a:fld>
             <a:endParaRPr lang="en-GB"/>
           </a:p>
@@ -877,7 +877,7 @@
           <a:p>
             <a:fld id="{C63CCCAA-046B-4FA1-910A-554349CB7EF0}" type="datetimeFigureOut">
               <a:rPr lang="en-GB" smtClean="0"/>
-              <a:t>08/03/2018</a:t>
+              <a:t>11/03/2018</a:t>
             </a:fld>
             <a:endParaRPr lang="en-GB"/>
           </a:p>
@@ -1153,7 +1153,7 @@
           <a:p>
             <a:fld id="{C63CCCAA-046B-4FA1-910A-554349CB7EF0}" type="datetimeFigureOut">
               <a:rPr lang="en-GB" smtClean="0"/>
-              <a:t>08/03/2018</a:t>
+              <a:t>11/03/2018</a:t>
             </a:fld>
             <a:endParaRPr lang="en-GB"/>
           </a:p>
@@ -1421,7 +1421,7 @@
           <a:p>
             <a:fld id="{C63CCCAA-046B-4FA1-910A-554349CB7EF0}" type="datetimeFigureOut">
               <a:rPr lang="en-GB" smtClean="0"/>
-              <a:t>08/03/2018</a:t>
+              <a:t>11/03/2018</a:t>
             </a:fld>
             <a:endParaRPr lang="en-GB"/>
           </a:p>
@@ -1836,7 +1836,7 @@
           <a:p>
             <a:fld id="{C63CCCAA-046B-4FA1-910A-554349CB7EF0}" type="datetimeFigureOut">
               <a:rPr lang="en-GB" smtClean="0"/>
-              <a:t>08/03/2018</a:t>
+              <a:t>11/03/2018</a:t>
             </a:fld>
             <a:endParaRPr lang="en-GB"/>
           </a:p>
@@ -1978,7 +1978,7 @@
           <a:p>
             <a:fld id="{C63CCCAA-046B-4FA1-910A-554349CB7EF0}" type="datetimeFigureOut">
               <a:rPr lang="en-GB" smtClean="0"/>
-              <a:t>08/03/2018</a:t>
+              <a:t>11/03/2018</a:t>
             </a:fld>
             <a:endParaRPr lang="en-GB"/>
           </a:p>
@@ -2091,7 +2091,7 @@
           <a:p>
             <a:fld id="{C63CCCAA-046B-4FA1-910A-554349CB7EF0}" type="datetimeFigureOut">
               <a:rPr lang="en-GB" smtClean="0"/>
-              <a:t>08/03/2018</a:t>
+              <a:t>11/03/2018</a:t>
             </a:fld>
             <a:endParaRPr lang="en-GB"/>
           </a:p>
@@ -2404,7 +2404,7 @@
           <a:p>
             <a:fld id="{C63CCCAA-046B-4FA1-910A-554349CB7EF0}" type="datetimeFigureOut">
               <a:rPr lang="en-GB" smtClean="0"/>
-              <a:t>08/03/2018</a:t>
+              <a:t>11/03/2018</a:t>
             </a:fld>
             <a:endParaRPr lang="en-GB"/>
           </a:p>
@@ -2693,7 +2693,7 @@
           <a:p>
             <a:fld id="{C63CCCAA-046B-4FA1-910A-554349CB7EF0}" type="datetimeFigureOut">
               <a:rPr lang="en-GB" smtClean="0"/>
-              <a:t>08/03/2018</a:t>
+              <a:t>11/03/2018</a:t>
             </a:fld>
             <a:endParaRPr lang="en-GB"/>
           </a:p>
@@ -2936,7 +2936,7 @@
           <a:p>
             <a:fld id="{C63CCCAA-046B-4FA1-910A-554349CB7EF0}" type="datetimeFigureOut">
               <a:rPr lang="en-GB" smtClean="0"/>
-              <a:t>08/03/2018</a:t>
+              <a:t>11/03/2018</a:t>
             </a:fld>
             <a:endParaRPr lang="en-GB"/>
           </a:p>
@@ -3449,10 +3449,10 @@
       </p:sp>
       <p:sp>
         <p:nvSpPr>
-          <p:cNvPr id="6" name="TextBox 5">
-            <a:extLst>
-              <a:ext uri="{FF2B5EF4-FFF2-40B4-BE49-F238E27FC236}">
-                <a16:creationId xmlns:a16="http://schemas.microsoft.com/office/drawing/2014/main" id="{D26F9928-474E-4943-A3C7-FD9ACE34AD02}"/>
+          <p:cNvPr id="7" name="TextBox 6">
+            <a:extLst>
+              <a:ext uri="{FF2B5EF4-FFF2-40B4-BE49-F238E27FC236}">
+                <a16:creationId xmlns:a16="http://schemas.microsoft.com/office/drawing/2014/main" id="{E3384245-F67D-43B5-9836-EBF90AD8DB27}"/>
               </a:ext>
             </a:extLst>
           </p:cNvPr>
@@ -3461,7 +3461,57 @@
         </p:nvSpPr>
         <p:spPr>
           <a:xfrm>
-            <a:off x="298579" y="3921644"/>
+            <a:off x="175487" y="5227121"/>
+            <a:ext cx="9075576" cy="1200329"/>
+          </a:xfrm>
+          <a:prstGeom prst="rect">
+            <a:avLst/>
+          </a:prstGeom>
+          <a:noFill/>
+        </p:spPr>
+        <p:txBody>
+          <a:bodyPr wrap="square" rtlCol="0">
+            <a:spAutoFit/>
+          </a:bodyPr>
+          <a:lstStyle/>
+          <a:p>
+            <a:r>
+              <a:rPr lang="en-GB" dirty="0"/>
+              <a:t>Hypothesis:</a:t>
+            </a:r>
+          </a:p>
+          <a:p>
+            <a:endParaRPr lang="en-GB" dirty="0"/>
+          </a:p>
+          <a:p>
+            <a:r>
+              <a:rPr lang="en-GB" dirty="0"/>
+              <a:t>Analysis of different MCTS improvements for GVG-AI</a:t>
+            </a:r>
+          </a:p>
+          <a:p>
+            <a:r>
+              <a:rPr lang="en-GB" dirty="0"/>
+              <a:t>Does  </a:t>
+            </a:r>
+          </a:p>
+        </p:txBody>
+      </p:sp>
+      <p:sp>
+        <p:nvSpPr>
+          <p:cNvPr id="8" name="TextBox 7">
+            <a:extLst>
+              <a:ext uri="{FF2B5EF4-FFF2-40B4-BE49-F238E27FC236}">
+                <a16:creationId xmlns:a16="http://schemas.microsoft.com/office/drawing/2014/main" id="{046CEED7-4C30-4FDF-AD61-A809875F5BD7}"/>
+              </a:ext>
+            </a:extLst>
+          </p:cNvPr>
+          <p:cNvSpPr txBox="1"/>
+          <p:nvPr/>
+        </p:nvSpPr>
+        <p:spPr>
+          <a:xfrm>
+            <a:off x="298579" y="2828835"/>
             <a:ext cx="9075576" cy="1477328"/>
           </a:xfrm>
           <a:prstGeom prst="rect">
@@ -3477,66 +3527,21 @@
           <a:p>
             <a:r>
               <a:rPr lang="en-US" dirty="0"/>
-              <a:t>How will answering these questions contribute to the state of knowledge in the field of your project?</a:t>
-            </a:r>
-          </a:p>
-          <a:p>
-            <a:endParaRPr lang="en-US" dirty="0"/>
-          </a:p>
-          <a:p>
-            <a:pPr marL="285750" indent="-285750">
-              <a:buFont typeface="Arial" panose="020B0604020202020204" pitchFamily="34" charset="0"/>
-              <a:buChar char="•"/>
-            </a:pPr>
+              <a:t> Can visualizing the actions an agent may take in the competition lead to insights about the strengths and weakness’ of each tree search algorithm </a:t>
+            </a:r>
+          </a:p>
+          <a:p>
             <a:r>
               <a:rPr lang="en-US" dirty="0"/>
-              <a:t>This research will help gather knowledge into the limitations of different game tree search techniques for AI.</a:t>
+              <a:t>How can the scaling of different metrics within the competition affect the performance of different tree search algorithms </a:t>
+            </a:r>
+          </a:p>
+          <a:p>
+            <a:r>
+              <a:rPr lang="en-US" dirty="0"/>
+              <a:t>Could a hyper-heuristic be created from the strengths of multiple tree search algorithms</a:t>
             </a:r>
             <a:endParaRPr lang="en-GB" dirty="0"/>
-          </a:p>
-        </p:txBody>
-      </p:sp>
-      <p:sp>
-        <p:nvSpPr>
-          <p:cNvPr id="7" name="TextBox 6">
-            <a:extLst>
-              <a:ext uri="{FF2B5EF4-FFF2-40B4-BE49-F238E27FC236}">
-                <a16:creationId xmlns:a16="http://schemas.microsoft.com/office/drawing/2014/main" id="{E3384245-F67D-43B5-9836-EBF90AD8DB27}"/>
-              </a:ext>
-            </a:extLst>
-          </p:cNvPr>
-          <p:cNvSpPr txBox="1"/>
-          <p:nvPr/>
-        </p:nvSpPr>
-        <p:spPr>
-          <a:xfrm>
-            <a:off x="298579" y="2721313"/>
-            <a:ext cx="9075576" cy="923330"/>
-          </a:xfrm>
-          <a:prstGeom prst="rect">
-            <a:avLst/>
-          </a:prstGeom>
-          <a:noFill/>
-        </p:spPr>
-        <p:txBody>
-          <a:bodyPr wrap="square" rtlCol="0">
-            <a:spAutoFit/>
-          </a:bodyPr>
-          <a:lstStyle/>
-          <a:p>
-            <a:r>
-              <a:rPr lang="en-GB" dirty="0"/>
-              <a:t>Hypothesis:</a:t>
-            </a:r>
-          </a:p>
-          <a:p>
-            <a:endParaRPr lang="en-GB" dirty="0"/>
-          </a:p>
-          <a:p>
-            <a:r>
-              <a:rPr lang="en-GB" dirty="0"/>
-              <a:t>Analysis of different MCTS improvements for GVG-AI </a:t>
-            </a:r>
           </a:p>
         </p:txBody>
       </p:sp>
@@ -3572,10 +3577,10 @@
       </p:grpSpPr>
       <p:sp>
         <p:nvSpPr>
-          <p:cNvPr id="4" name="TextBox 3">
-            <a:extLst>
-              <a:ext uri="{FF2B5EF4-FFF2-40B4-BE49-F238E27FC236}">
-                <a16:creationId xmlns:a16="http://schemas.microsoft.com/office/drawing/2014/main" id="{0D421A23-4C62-4BA8-BC69-FD7475CCFB27}"/>
+          <p:cNvPr id="3" name="TextBox 2">
+            <a:extLst>
+              <a:ext uri="{FF2B5EF4-FFF2-40B4-BE49-F238E27FC236}">
+                <a16:creationId xmlns:a16="http://schemas.microsoft.com/office/drawing/2014/main" id="{68C80D07-2D9E-4EF1-B881-78700500CE25}"/>
               </a:ext>
             </a:extLst>
           </p:cNvPr>
@@ -3584,8 +3589,8 @@
         </p:nvSpPr>
         <p:spPr>
           <a:xfrm>
-            <a:off x="298579" y="230157"/>
-            <a:ext cx="7564017" cy="646331"/>
+            <a:off x="263410" y="220083"/>
+            <a:ext cx="9075576" cy="1477328"/>
           </a:xfrm>
           <a:prstGeom prst="rect">
             <a:avLst/>
@@ -3601,6 +3606,79 @@
             <a:r>
               <a:rPr lang="en-US" dirty="0"/>
               <a:t>How will answering these questions contribute to the state of knowledge in the field of your project?</a:t>
+            </a:r>
+          </a:p>
+          <a:p>
+            <a:endParaRPr lang="en-US" dirty="0"/>
+          </a:p>
+          <a:p>
+            <a:pPr marL="285750" indent="-285750">
+              <a:buFont typeface="Arial" panose="020B0604020202020204" pitchFamily="34" charset="0"/>
+              <a:buChar char="•"/>
+            </a:pPr>
+            <a:r>
+              <a:rPr lang="en-US" dirty="0"/>
+              <a:t>This research will help gather knowledge into the limitations of different game tree search techniques for AI.</a:t>
+            </a:r>
+            <a:endParaRPr lang="en-GB" dirty="0"/>
+          </a:p>
+        </p:txBody>
+      </p:sp>
+      <p:sp>
+        <p:nvSpPr>
+          <p:cNvPr id="5" name="TextBox 4">
+            <a:extLst>
+              <a:ext uri="{FF2B5EF4-FFF2-40B4-BE49-F238E27FC236}">
+                <a16:creationId xmlns:a16="http://schemas.microsoft.com/office/drawing/2014/main" id="{18D3A235-65E9-43D6-B80C-6CB81816A0A6}"/>
+              </a:ext>
+            </a:extLst>
+          </p:cNvPr>
+          <p:cNvSpPr txBox="1"/>
+          <p:nvPr/>
+        </p:nvSpPr>
+        <p:spPr>
+          <a:xfrm>
+            <a:off x="263410" y="2429883"/>
+            <a:ext cx="9075576" cy="1754326"/>
+          </a:xfrm>
+          <a:prstGeom prst="rect">
+            <a:avLst/>
+          </a:prstGeom>
+          <a:noFill/>
+        </p:spPr>
+        <p:txBody>
+          <a:bodyPr wrap="square" rtlCol="0">
+            <a:spAutoFit/>
+          </a:bodyPr>
+          <a:lstStyle/>
+          <a:p>
+            <a:pPr marL="285750" indent="-285750">
+              <a:buFont typeface="Arial" panose="020B0604020202020204" pitchFamily="34" charset="0"/>
+              <a:buChar char="•"/>
+            </a:pPr>
+            <a:r>
+              <a:rPr lang="en-US" dirty="0"/>
+              <a:t>To create a hyper heuristic agent that has been modified from the strengths and weaknesses found in different tree search techniques. </a:t>
+            </a:r>
+          </a:p>
+          <a:p>
+            <a:pPr marL="285750" indent="-285750">
+              <a:buFont typeface="Arial" panose="020B0604020202020204" pitchFamily="34" charset="0"/>
+              <a:buChar char="•"/>
+            </a:pPr>
+            <a:r>
+              <a:rPr lang="en-US" dirty="0"/>
+              <a:t>The strengths and weaknesses will be found by visualizing and analyzing the search space of a tree search algorithm. </a:t>
+            </a:r>
+          </a:p>
+          <a:p>
+            <a:pPr marL="285750" indent="-285750">
+              <a:buFont typeface="Arial" panose="020B0604020202020204" pitchFamily="34" charset="0"/>
+              <a:buChar char="•"/>
+            </a:pPr>
+            <a:r>
+              <a:rPr lang="en-US" dirty="0"/>
+              <a:t>Also by looking at how the scaling of different metrics within the competition frame work and seeing how they affect the performance of different agents.</a:t>
             </a:r>
             <a:endParaRPr lang="en-GB" dirty="0"/>
           </a:p>
@@ -3776,9 +3854,151 @@
           <a:p>
             <a:r>
               <a:rPr lang="en-US" dirty="0"/>
-              <a:t>What results have you obtained?</a:t>
-            </a:r>
-            <a:endParaRPr lang="en-GB" dirty="0"/>
+              <a:t>Basic Results:</a:t>
+            </a:r>
+          </a:p>
+        </p:txBody>
+      </p:sp>
+      <p:pic>
+        <p:nvPicPr>
+          <p:cNvPr id="3" name="Picture 2">
+            <a:extLst>
+              <a:ext uri="{FF2B5EF4-FFF2-40B4-BE49-F238E27FC236}">
+                <a16:creationId xmlns:a16="http://schemas.microsoft.com/office/drawing/2014/main" id="{332603B8-6CBE-4361-8DF7-96C49E91E2AE}"/>
+              </a:ext>
+            </a:extLst>
+          </p:cNvPr>
+          <p:cNvPicPr>
+            <a:picLocks noChangeAspect="1"/>
+          </p:cNvPicPr>
+          <p:nvPr/>
+        </p:nvPicPr>
+        <p:blipFill>
+          <a:blip r:embed="rId2">
+            <a:extLst>
+              <a:ext uri="{28A0092B-C50C-407E-A947-70E740481C1C}">
+                <a14:useLocalDpi xmlns:a14="http://schemas.microsoft.com/office/drawing/2010/main" val="0"/>
+              </a:ext>
+            </a:extLst>
+          </a:blip>
+          <a:stretch>
+            <a:fillRect/>
+          </a:stretch>
+        </p:blipFill>
+        <p:spPr>
+          <a:xfrm>
+            <a:off x="7275487" y="1692312"/>
+            <a:ext cx="4251230" cy="1437190"/>
+          </a:xfrm>
+          <a:prstGeom prst="rect">
+            <a:avLst/>
+          </a:prstGeom>
+        </p:spPr>
+      </p:pic>
+      <p:pic>
+        <p:nvPicPr>
+          <p:cNvPr id="6" name="Picture 5">
+            <a:extLst>
+              <a:ext uri="{FF2B5EF4-FFF2-40B4-BE49-F238E27FC236}">
+                <a16:creationId xmlns:a16="http://schemas.microsoft.com/office/drawing/2014/main" id="{1564A6E9-7BAF-439B-B923-0E74F6729408}"/>
+              </a:ext>
+            </a:extLst>
+          </p:cNvPr>
+          <p:cNvPicPr>
+            <a:picLocks noChangeAspect="1"/>
+          </p:cNvPicPr>
+          <p:nvPr/>
+        </p:nvPicPr>
+        <p:blipFill>
+          <a:blip r:embed="rId3">
+            <a:extLst>
+              <a:ext uri="{28A0092B-C50C-407E-A947-70E740481C1C}">
+                <a14:useLocalDpi xmlns:a14="http://schemas.microsoft.com/office/drawing/2010/main" val="0"/>
+              </a:ext>
+            </a:extLst>
+          </a:blip>
+          <a:stretch>
+            <a:fillRect/>
+          </a:stretch>
+        </p:blipFill>
+        <p:spPr>
+          <a:xfrm>
+            <a:off x="7442539" y="3164056"/>
+            <a:ext cx="4251230" cy="1437190"/>
+          </a:xfrm>
+          <a:prstGeom prst="rect">
+            <a:avLst/>
+          </a:prstGeom>
+        </p:spPr>
+      </p:pic>
+      <p:pic>
+        <p:nvPicPr>
+          <p:cNvPr id="8" name="Picture 7">
+            <a:extLst>
+              <a:ext uri="{FF2B5EF4-FFF2-40B4-BE49-F238E27FC236}">
+                <a16:creationId xmlns:a16="http://schemas.microsoft.com/office/drawing/2014/main" id="{CE6845B2-998D-49A6-8C6D-E6ADF187677D}"/>
+              </a:ext>
+            </a:extLst>
+          </p:cNvPr>
+          <p:cNvPicPr>
+            <a:picLocks noChangeAspect="1"/>
+          </p:cNvPicPr>
+          <p:nvPr/>
+        </p:nvPicPr>
+        <p:blipFill>
+          <a:blip r:embed="rId4">
+            <a:extLst>
+              <a:ext uri="{28A0092B-C50C-407E-A947-70E740481C1C}">
+                <a14:useLocalDpi xmlns:a14="http://schemas.microsoft.com/office/drawing/2010/main" val="0"/>
+              </a:ext>
+            </a:extLst>
+          </a:blip>
+          <a:stretch>
+            <a:fillRect/>
+          </a:stretch>
+        </p:blipFill>
+        <p:spPr>
+          <a:xfrm>
+            <a:off x="498231" y="3164056"/>
+            <a:ext cx="4175045" cy="2890416"/>
+          </a:xfrm>
+          <a:prstGeom prst="rect">
+            <a:avLst/>
+          </a:prstGeom>
+        </p:spPr>
+      </p:pic>
+      <p:sp>
+        <p:nvSpPr>
+          <p:cNvPr id="9" name="TextBox 8">
+            <a:extLst>
+              <a:ext uri="{FF2B5EF4-FFF2-40B4-BE49-F238E27FC236}">
+                <a16:creationId xmlns:a16="http://schemas.microsoft.com/office/drawing/2014/main" id="{D101D859-425D-4DB4-9169-08E18CFA6AC8}"/>
+              </a:ext>
+            </a:extLst>
+          </p:cNvPr>
+          <p:cNvSpPr txBox="1"/>
+          <p:nvPr/>
+        </p:nvSpPr>
+        <p:spPr>
+          <a:xfrm>
+            <a:off x="498231" y="2760170"/>
+            <a:ext cx="1877245" cy="369332"/>
+          </a:xfrm>
+          <a:prstGeom prst="rect">
+            <a:avLst/>
+          </a:prstGeom>
+          <a:noFill/>
+        </p:spPr>
+        <p:txBody>
+          <a:bodyPr wrap="none" rtlCol="0">
+            <a:spAutoFit/>
+          </a:bodyPr>
+          <a:lstStyle/>
+          <a:p>
+            <a:r>
+              <a:rPr lang="en-GB" dirty="0"/>
+              <a:t>One game played:</a:t>
+            </a:r>
           </a:p>
         </p:txBody>
       </p:sp>

</xml_diff>

<commit_message>
First full simulation almost complete
</commit_message>
<xml_diff>
--- a/Presentations/Findings Presentation/Findings.pptx
+++ b/Presentations/Findings Presentation/Findings.pptx
@@ -9,9 +9,10 @@
     <p:sldId id="257" r:id="rId3"/>
     <p:sldId id="258" r:id="rId4"/>
     <p:sldId id="259" r:id="rId5"/>
-    <p:sldId id="260" r:id="rId6"/>
-    <p:sldId id="261" r:id="rId7"/>
-    <p:sldId id="262" r:id="rId8"/>
+    <p:sldId id="263" r:id="rId6"/>
+    <p:sldId id="260" r:id="rId7"/>
+    <p:sldId id="261" r:id="rId8"/>
+    <p:sldId id="262" r:id="rId9"/>
   </p:sldIdLst>
   <p:sldSz cx="12192000" cy="6858000"/>
   <p:notesSz cx="6858000" cy="9144000"/>
@@ -3854,7 +3855,7 @@
           <a:p>
             <a:r>
               <a:rPr lang="en-US" dirty="0"/>
-              <a:t>Basic Results:</a:t>
+              <a:t>Current Results:</a:t>
             </a:r>
           </a:p>
         </p:txBody>
@@ -4002,6 +4003,42 @@
           </a:p>
         </p:txBody>
       </p:sp>
+      <p:pic>
+        <p:nvPicPr>
+          <p:cNvPr id="11" name="Picture 10">
+            <a:extLst>
+              <a:ext uri="{FF2B5EF4-FFF2-40B4-BE49-F238E27FC236}">
+                <a16:creationId xmlns:a16="http://schemas.microsoft.com/office/drawing/2014/main" id="{51D833BB-F252-4D74-95AA-0C3EFAB9D18E}"/>
+              </a:ext>
+            </a:extLst>
+          </p:cNvPr>
+          <p:cNvPicPr>
+            <a:picLocks noChangeAspect="1"/>
+          </p:cNvPicPr>
+          <p:nvPr/>
+        </p:nvPicPr>
+        <p:blipFill>
+          <a:blip r:embed="rId5">
+            <a:extLst>
+              <a:ext uri="{28A0092B-C50C-407E-A947-70E740481C1C}">
+                <a14:useLocalDpi xmlns:a14="http://schemas.microsoft.com/office/drawing/2010/main" val="0"/>
+              </a:ext>
+            </a:extLst>
+          </a:blip>
+          <a:stretch>
+            <a:fillRect/>
+          </a:stretch>
+        </p:blipFill>
+        <p:spPr>
+          <a:xfrm>
+            <a:off x="4999556" y="3129502"/>
+            <a:ext cx="3968598" cy="2913881"/>
+          </a:xfrm>
+          <a:prstGeom prst="rect">
+            <a:avLst/>
+          </a:prstGeom>
+        </p:spPr>
+      </p:pic>
     </p:spTree>
     <p:extLst>
       <p:ext uri="{BB962C8B-B14F-4D97-AF65-F5344CB8AC3E}">
@@ -4032,12 +4069,83 @@
           <a:chExt cx="0" cy="0"/>
         </a:xfrm>
       </p:grpSpPr>
-      <p:sp>
-        <p:nvSpPr>
-          <p:cNvPr id="4" name="TextBox 3">
-            <a:extLst>
-              <a:ext uri="{FF2B5EF4-FFF2-40B4-BE49-F238E27FC236}">
-                <a16:creationId xmlns:a16="http://schemas.microsoft.com/office/drawing/2014/main" id="{0D421A23-4C62-4BA8-BC69-FD7475CCFB27}"/>
+      <p:pic>
+        <p:nvPicPr>
+          <p:cNvPr id="8" name="Picture 7">
+            <a:extLst>
+              <a:ext uri="{FF2B5EF4-FFF2-40B4-BE49-F238E27FC236}">
+                <a16:creationId xmlns:a16="http://schemas.microsoft.com/office/drawing/2014/main" id="{0DA260D5-5FDB-4FB9-8EB9-1E47D52150EE}"/>
+              </a:ext>
+            </a:extLst>
+          </p:cNvPr>
+          <p:cNvPicPr>
+            <a:picLocks noChangeAspect="1"/>
+          </p:cNvPicPr>
+          <p:nvPr/>
+        </p:nvPicPr>
+        <p:blipFill>
+          <a:blip r:embed="rId2">
+            <a:extLst>
+              <a:ext uri="{28A0092B-C50C-407E-A947-70E740481C1C}">
+                <a14:useLocalDpi xmlns:a14="http://schemas.microsoft.com/office/drawing/2010/main" val="0"/>
+              </a:ext>
+            </a:extLst>
+          </a:blip>
+          <a:stretch>
+            <a:fillRect/>
+          </a:stretch>
+        </p:blipFill>
+        <p:spPr>
+          <a:xfrm>
+            <a:off x="1183695" y="2444261"/>
+            <a:ext cx="4512606" cy="3313310"/>
+          </a:xfrm>
+          <a:prstGeom prst="rect">
+            <a:avLst/>
+          </a:prstGeom>
+        </p:spPr>
+      </p:pic>
+      <p:sp>
+        <p:nvSpPr>
+          <p:cNvPr id="9" name="TextBox 8">
+            <a:extLst>
+              <a:ext uri="{FF2B5EF4-FFF2-40B4-BE49-F238E27FC236}">
+                <a16:creationId xmlns:a16="http://schemas.microsoft.com/office/drawing/2014/main" id="{B98A23F0-E5DC-4BF9-8070-445C2786466A}"/>
+              </a:ext>
+            </a:extLst>
+          </p:cNvPr>
+          <p:cNvSpPr txBox="1"/>
+          <p:nvPr/>
+        </p:nvSpPr>
+        <p:spPr>
+          <a:xfrm>
+            <a:off x="1857382" y="5965672"/>
+            <a:ext cx="3165232" cy="369332"/>
+          </a:xfrm>
+          <a:prstGeom prst="rect">
+            <a:avLst/>
+          </a:prstGeom>
+          <a:noFill/>
+        </p:spPr>
+        <p:txBody>
+          <a:bodyPr wrap="square" rtlCol="0">
+            <a:spAutoFit/>
+          </a:bodyPr>
+          <a:lstStyle/>
+          <a:p>
+            <a:r>
+              <a:rPr lang="en-US" dirty="0"/>
+              <a:t>OLMCTS controller / 10 Games</a:t>
+            </a:r>
+          </a:p>
+        </p:txBody>
+      </p:sp>
+      <p:sp>
+        <p:nvSpPr>
+          <p:cNvPr id="10" name="TextBox 9">
+            <a:extLst>
+              <a:ext uri="{FF2B5EF4-FFF2-40B4-BE49-F238E27FC236}">
+                <a16:creationId xmlns:a16="http://schemas.microsoft.com/office/drawing/2014/main" id="{43B34843-0FB6-4B20-9292-5A3A7135B975}"/>
               </a:ext>
             </a:extLst>
           </p:cNvPr>
@@ -4062,24 +4170,15 @@
           <a:p>
             <a:r>
               <a:rPr lang="en-US" dirty="0"/>
-              <a:t>How have you </a:t>
-            </a:r>
-            <a:r>
-              <a:rPr lang="en-US" dirty="0" err="1"/>
-              <a:t>analysed</a:t>
-            </a:r>
-            <a:r>
-              <a:rPr lang="en-US" dirty="0"/>
-              <a:t> and interpreted these results?</a:t>
-            </a:r>
-            <a:endParaRPr lang="en-GB" dirty="0"/>
+              <a:t>Current Results:</a:t>
+            </a:r>
           </a:p>
         </p:txBody>
       </p:sp>
     </p:spTree>
     <p:extLst>
       <p:ext uri="{BB962C8B-B14F-4D97-AF65-F5344CB8AC3E}">
-        <p14:creationId xmlns:p14="http://schemas.microsoft.com/office/powerpoint/2010/main" val="376911726"/>
+        <p14:creationId xmlns:p14="http://schemas.microsoft.com/office/powerpoint/2010/main" val="3204695554"/>
       </p:ext>
     </p:extLst>
   </p:cSld>
@@ -4136,6 +4235,72 @@
           <a:p>
             <a:r>
               <a:rPr lang="en-US" dirty="0"/>
+              <a:t>How have you analyzed and interpreted these results?</a:t>
+            </a:r>
+            <a:endParaRPr lang="en-GB" dirty="0"/>
+          </a:p>
+        </p:txBody>
+      </p:sp>
+    </p:spTree>
+    <p:extLst>
+      <p:ext uri="{BB962C8B-B14F-4D97-AF65-F5344CB8AC3E}">
+        <p14:creationId xmlns:p14="http://schemas.microsoft.com/office/powerpoint/2010/main" val="376911726"/>
+      </p:ext>
+    </p:extLst>
+  </p:cSld>
+  <p:clrMapOvr>
+    <a:masterClrMapping/>
+  </p:clrMapOvr>
+</p:sld>
+</file>
+
+<file path=ppt/slides/slide7.xml><?xml version="1.0" encoding="utf-8"?>
+<p:sld xmlns:a="http://schemas.openxmlformats.org/drawingml/2006/main" xmlns:r="http://schemas.openxmlformats.org/officeDocument/2006/relationships" xmlns:p="http://schemas.openxmlformats.org/presentationml/2006/main">
+  <p:cSld>
+    <p:spTree>
+      <p:nvGrpSpPr>
+        <p:cNvPr id="1" name=""/>
+        <p:cNvGrpSpPr/>
+        <p:nvPr/>
+      </p:nvGrpSpPr>
+      <p:grpSpPr>
+        <a:xfrm>
+          <a:off x="0" y="0"/>
+          <a:ext cx="0" cy="0"/>
+          <a:chOff x="0" y="0"/>
+          <a:chExt cx="0" cy="0"/>
+        </a:xfrm>
+      </p:grpSpPr>
+      <p:sp>
+        <p:nvSpPr>
+          <p:cNvPr id="4" name="TextBox 3">
+            <a:extLst>
+              <a:ext uri="{FF2B5EF4-FFF2-40B4-BE49-F238E27FC236}">
+                <a16:creationId xmlns:a16="http://schemas.microsoft.com/office/drawing/2014/main" id="{0D421A23-4C62-4BA8-BC69-FD7475CCFB27}"/>
+              </a:ext>
+            </a:extLst>
+          </p:cNvPr>
+          <p:cNvSpPr txBox="1"/>
+          <p:nvPr/>
+        </p:nvSpPr>
+        <p:spPr>
+          <a:xfrm>
+            <a:off x="298579" y="230157"/>
+            <a:ext cx="7564017" cy="369332"/>
+          </a:xfrm>
+          <a:prstGeom prst="rect">
+            <a:avLst/>
+          </a:prstGeom>
+          <a:noFill/>
+        </p:spPr>
+        <p:txBody>
+          <a:bodyPr wrap="square" rtlCol="0">
+            <a:spAutoFit/>
+          </a:bodyPr>
+          <a:lstStyle/>
+          <a:p>
+            <a:r>
+              <a:rPr lang="en-US" dirty="0"/>
               <a:t>What are you likely to conclude on the basis of this research?</a:t>
             </a:r>
             <a:endParaRPr lang="en-GB" dirty="0"/>
@@ -4155,7 +4320,7 @@
 </p:sld>
 </file>
 
-<file path=ppt/slides/slide7.xml><?xml version="1.0" encoding="utf-8"?>
+<file path=ppt/slides/slide8.xml><?xml version="1.0" encoding="utf-8"?>
 <p:sld xmlns:a="http://schemas.openxmlformats.org/drawingml/2006/main" xmlns:r="http://schemas.openxmlformats.org/officeDocument/2006/relationships" xmlns:p="http://schemas.openxmlformats.org/presentationml/2006/main">
   <p:cSld>
     <p:spTree>

</xml_diff>

<commit_message>
Added all the competition controllers to directory
</commit_message>
<xml_diff>
--- a/Presentations/Findings Presentation/Findings.pptx
+++ b/Presentations/Findings Presentation/Findings.pptx
@@ -10,9 +10,10 @@
     <p:sldId id="258" r:id="rId4"/>
     <p:sldId id="259" r:id="rId5"/>
     <p:sldId id="263" r:id="rId6"/>
-    <p:sldId id="260" r:id="rId7"/>
-    <p:sldId id="261" r:id="rId8"/>
-    <p:sldId id="262" r:id="rId9"/>
+    <p:sldId id="264" r:id="rId7"/>
+    <p:sldId id="260" r:id="rId8"/>
+    <p:sldId id="261" r:id="rId9"/>
+    <p:sldId id="262" r:id="rId10"/>
   </p:sldIdLst>
   <p:sldSz cx="12192000" cy="6858000"/>
   <p:notesSz cx="6858000" cy="9144000"/>
@@ -3493,7 +3494,7 @@
           <a:p>
             <a:r>
               <a:rPr lang="en-GB" dirty="0"/>
-              <a:t>Does  </a:t>
+              <a:t>What is the most effective modification to MCTS</a:t>
             </a:r>
           </a:p>
         </p:txBody>
@@ -3748,50 +3749,6 @@
               <a:t>Why have you applied particular methods in seeking answers to these questions?</a:t>
             </a:r>
             <a:endParaRPr lang="en-GB" dirty="0"/>
-          </a:p>
-        </p:txBody>
-      </p:sp>
-      <p:sp>
-        <p:nvSpPr>
-          <p:cNvPr id="3" name="TextBox 2">
-            <a:extLst>
-              <a:ext uri="{FF2B5EF4-FFF2-40B4-BE49-F238E27FC236}">
-                <a16:creationId xmlns:a16="http://schemas.microsoft.com/office/drawing/2014/main" id="{E01AB5AA-4354-4F08-B5DC-4E20D3508EF4}"/>
-              </a:ext>
-            </a:extLst>
-          </p:cNvPr>
-          <p:cNvSpPr txBox="1"/>
-          <p:nvPr/>
-        </p:nvSpPr>
-        <p:spPr>
-          <a:xfrm>
-            <a:off x="298579" y="1615129"/>
-            <a:ext cx="9075576" cy="923330"/>
-          </a:xfrm>
-          <a:prstGeom prst="rect">
-            <a:avLst/>
-          </a:prstGeom>
-          <a:noFill/>
-        </p:spPr>
-        <p:txBody>
-          <a:bodyPr wrap="square" rtlCol="0">
-            <a:spAutoFit/>
-          </a:bodyPr>
-          <a:lstStyle/>
-          <a:p>
-            <a:r>
-              <a:rPr lang="en-GB" dirty="0"/>
-              <a:t>Methods:</a:t>
-            </a:r>
-          </a:p>
-          <a:p>
-            <a:endParaRPr lang="en-GB" dirty="0"/>
-          </a:p>
-          <a:p>
-            <a:r>
-              <a:rPr lang="en-GB" dirty="0"/>
-              <a:t>Abduction, Induction, Deduction</a:t>
-            </a:r>
           </a:p>
         </p:txBody>
       </p:sp>
@@ -4069,12 +4026,82 @@
           <a:chExt cx="0" cy="0"/>
         </a:xfrm>
       </p:grpSpPr>
+      <p:sp>
+        <p:nvSpPr>
+          <p:cNvPr id="9" name="TextBox 8">
+            <a:extLst>
+              <a:ext uri="{FF2B5EF4-FFF2-40B4-BE49-F238E27FC236}">
+                <a16:creationId xmlns:a16="http://schemas.microsoft.com/office/drawing/2014/main" id="{B98A23F0-E5DC-4BF9-8070-445C2786466A}"/>
+              </a:ext>
+            </a:extLst>
+          </p:cNvPr>
+          <p:cNvSpPr txBox="1"/>
+          <p:nvPr/>
+        </p:nvSpPr>
+        <p:spPr>
+          <a:xfrm>
+            <a:off x="370369" y="3578298"/>
+            <a:ext cx="3607053" cy="369332"/>
+          </a:xfrm>
+          <a:prstGeom prst="rect">
+            <a:avLst/>
+          </a:prstGeom>
+          <a:noFill/>
+        </p:spPr>
+        <p:txBody>
+          <a:bodyPr wrap="square" rtlCol="0">
+            <a:spAutoFit/>
+          </a:bodyPr>
+          <a:lstStyle/>
+          <a:p>
+            <a:r>
+              <a:rPr lang="en-US" dirty="0"/>
+              <a:t>OLMCTS controller after 10 Games</a:t>
+            </a:r>
+          </a:p>
+        </p:txBody>
+      </p:sp>
+      <p:sp>
+        <p:nvSpPr>
+          <p:cNvPr id="10" name="TextBox 9">
+            <a:extLst>
+              <a:ext uri="{FF2B5EF4-FFF2-40B4-BE49-F238E27FC236}">
+                <a16:creationId xmlns:a16="http://schemas.microsoft.com/office/drawing/2014/main" id="{43B34843-0FB6-4B20-9292-5A3A7135B975}"/>
+              </a:ext>
+            </a:extLst>
+          </p:cNvPr>
+          <p:cNvSpPr txBox="1"/>
+          <p:nvPr/>
+        </p:nvSpPr>
+        <p:spPr>
+          <a:xfrm>
+            <a:off x="298579" y="201579"/>
+            <a:ext cx="7564017" cy="523220"/>
+          </a:xfrm>
+          <a:prstGeom prst="rect">
+            <a:avLst/>
+          </a:prstGeom>
+          <a:noFill/>
+        </p:spPr>
+        <p:txBody>
+          <a:bodyPr wrap="square" rtlCol="0">
+            <a:spAutoFit/>
+          </a:bodyPr>
+          <a:lstStyle/>
+          <a:p>
+            <a:r>
+              <a:rPr lang="en-US" sz="2800" b="1" dirty="0"/>
+              <a:t>Current Results:</a:t>
+            </a:r>
+          </a:p>
+        </p:txBody>
+      </p:sp>
       <p:pic>
         <p:nvPicPr>
-          <p:cNvPr id="8" name="Picture 7">
-            <a:extLst>
-              <a:ext uri="{FF2B5EF4-FFF2-40B4-BE49-F238E27FC236}">
-                <a16:creationId xmlns:a16="http://schemas.microsoft.com/office/drawing/2014/main" id="{0DA260D5-5FDB-4FB9-8EB9-1E47D52150EE}"/>
+          <p:cNvPr id="3" name="Picture 2">
+            <a:extLst>
+              <a:ext uri="{FF2B5EF4-FFF2-40B4-BE49-F238E27FC236}">
+                <a16:creationId xmlns:a16="http://schemas.microsoft.com/office/drawing/2014/main" id="{EED427F1-8E74-4EDF-AB39-779E478FB614}"/>
               </a:ext>
             </a:extLst>
           </p:cNvPr>
@@ -4097,20 +4124,56 @@
         </p:blipFill>
         <p:spPr>
           <a:xfrm>
-            <a:off x="1183695" y="2444261"/>
-            <a:ext cx="4512606" cy="3313310"/>
+            <a:off x="4399630" y="1118119"/>
+            <a:ext cx="3392737" cy="2348818"/>
           </a:xfrm>
           <a:prstGeom prst="rect">
             <a:avLst/>
           </a:prstGeom>
         </p:spPr>
       </p:pic>
-      <p:sp>
-        <p:nvSpPr>
-          <p:cNvPr id="9" name="TextBox 8">
-            <a:extLst>
-              <a:ext uri="{FF2B5EF4-FFF2-40B4-BE49-F238E27FC236}">
-                <a16:creationId xmlns:a16="http://schemas.microsoft.com/office/drawing/2014/main" id="{B98A23F0-E5DC-4BF9-8070-445C2786466A}"/>
+      <p:pic>
+        <p:nvPicPr>
+          <p:cNvPr id="5" name="Picture 4">
+            <a:extLst>
+              <a:ext uri="{FF2B5EF4-FFF2-40B4-BE49-F238E27FC236}">
+                <a16:creationId xmlns:a16="http://schemas.microsoft.com/office/drawing/2014/main" id="{F8E7D04A-91C8-4931-A83C-EB2970E09002}"/>
+              </a:ext>
+            </a:extLst>
+          </p:cNvPr>
+          <p:cNvPicPr>
+            <a:picLocks noChangeAspect="1"/>
+          </p:cNvPicPr>
+          <p:nvPr/>
+        </p:nvPicPr>
+        <p:blipFill>
+          <a:blip r:embed="rId3">
+            <a:extLst>
+              <a:ext uri="{28A0092B-C50C-407E-A947-70E740481C1C}">
+                <a14:useLocalDpi xmlns:a14="http://schemas.microsoft.com/office/drawing/2010/main" val="0"/>
+              </a:ext>
+            </a:extLst>
+          </a:blip>
+          <a:stretch>
+            <a:fillRect/>
+          </a:stretch>
+        </p:blipFill>
+        <p:spPr>
+          <a:xfrm>
+            <a:off x="370369" y="1118119"/>
+            <a:ext cx="3392737" cy="2348818"/>
+          </a:xfrm>
+          <a:prstGeom prst="rect">
+            <a:avLst/>
+          </a:prstGeom>
+        </p:spPr>
+      </p:pic>
+      <p:sp>
+        <p:nvSpPr>
+          <p:cNvPr id="11" name="TextBox 10">
+            <a:extLst>
+              <a:ext uri="{FF2B5EF4-FFF2-40B4-BE49-F238E27FC236}">
+                <a16:creationId xmlns:a16="http://schemas.microsoft.com/office/drawing/2014/main" id="{A39BBDF7-E670-4C9D-9FBB-ACA0CFA46BC0}"/>
               </a:ext>
             </a:extLst>
           </p:cNvPr>
@@ -4119,7 +4182,7 @@
         </p:nvSpPr>
         <p:spPr>
           <a:xfrm>
-            <a:off x="1857382" y="5965672"/>
+            <a:off x="4513383" y="3578298"/>
             <a:ext cx="3165232" cy="369332"/>
           </a:xfrm>
           <a:prstGeom prst="rect">
@@ -4135,17 +4198,53 @@
           <a:p>
             <a:r>
               <a:rPr lang="en-US" dirty="0"/>
-              <a:t>OLMCTS controller / 10 Games</a:t>
-            </a:r>
-          </a:p>
-        </p:txBody>
-      </p:sp>
-      <p:sp>
-        <p:nvSpPr>
-          <p:cNvPr id="10" name="TextBox 9">
-            <a:extLst>
-              <a:ext uri="{FF2B5EF4-FFF2-40B4-BE49-F238E27FC236}">
-                <a16:creationId xmlns:a16="http://schemas.microsoft.com/office/drawing/2014/main" id="{43B34843-0FB6-4B20-9292-5A3A7135B975}"/>
+              <a:t>MCTS controller after 10 Games</a:t>
+            </a:r>
+          </a:p>
+        </p:txBody>
+      </p:sp>
+      <p:pic>
+        <p:nvPicPr>
+          <p:cNvPr id="7" name="Picture 6">
+            <a:extLst>
+              <a:ext uri="{FF2B5EF4-FFF2-40B4-BE49-F238E27FC236}">
+                <a16:creationId xmlns:a16="http://schemas.microsoft.com/office/drawing/2014/main" id="{A45A19D7-89FC-4155-86BC-8A343C9B4936}"/>
+              </a:ext>
+            </a:extLst>
+          </p:cNvPr>
+          <p:cNvPicPr>
+            <a:picLocks noChangeAspect="1"/>
+          </p:cNvPicPr>
+          <p:nvPr/>
+        </p:nvPicPr>
+        <p:blipFill>
+          <a:blip r:embed="rId4">
+            <a:extLst>
+              <a:ext uri="{28A0092B-C50C-407E-A947-70E740481C1C}">
+                <a14:useLocalDpi xmlns:a14="http://schemas.microsoft.com/office/drawing/2010/main" val="0"/>
+              </a:ext>
+            </a:extLst>
+          </a:blip>
+          <a:stretch>
+            <a:fillRect/>
+          </a:stretch>
+        </p:blipFill>
+        <p:spPr>
+          <a:xfrm>
+            <a:off x="8428891" y="1118119"/>
+            <a:ext cx="3392736" cy="2348818"/>
+          </a:xfrm>
+          <a:prstGeom prst="rect">
+            <a:avLst/>
+          </a:prstGeom>
+        </p:spPr>
+      </p:pic>
+      <p:sp>
+        <p:nvSpPr>
+          <p:cNvPr id="12" name="TextBox 11">
+            <a:extLst>
+              <a:ext uri="{FF2B5EF4-FFF2-40B4-BE49-F238E27FC236}">
+                <a16:creationId xmlns:a16="http://schemas.microsoft.com/office/drawing/2014/main" id="{57E24049-FFEB-4DDE-AF0C-CA13C7E91B35}"/>
               </a:ext>
             </a:extLst>
           </p:cNvPr>
@@ -4154,8 +4253,8 @@
         </p:nvSpPr>
         <p:spPr>
           <a:xfrm>
-            <a:off x="298579" y="230157"/>
-            <a:ext cx="7564017" cy="369332"/>
+            <a:off x="8343899" y="3578298"/>
+            <a:ext cx="3477728" cy="369332"/>
           </a:xfrm>
           <a:prstGeom prst="rect">
             <a:avLst/>
@@ -4169,12 +4268,230 @@
           <a:lstStyle/>
           <a:p>
             <a:r>
+              <a:rPr lang="en-US" dirty="0" err="1"/>
+              <a:t>FlatMCTS</a:t>
+            </a:r>
+            <a:r>
               <a:rPr lang="en-US" dirty="0"/>
-              <a:t>Current Results:</a:t>
-            </a:r>
-          </a:p>
-        </p:txBody>
-      </p:sp>
+              <a:t> controller after 10 games</a:t>
+            </a:r>
+          </a:p>
+        </p:txBody>
+      </p:sp>
+      <p:sp>
+        <p:nvSpPr>
+          <p:cNvPr id="13" name="TextBox 12">
+            <a:extLst>
+              <a:ext uri="{FF2B5EF4-FFF2-40B4-BE49-F238E27FC236}">
+                <a16:creationId xmlns:a16="http://schemas.microsoft.com/office/drawing/2014/main" id="{222EAFA0-527C-44E1-B7A1-277C8C2142E7}"/>
+              </a:ext>
+            </a:extLst>
+          </p:cNvPr>
+          <p:cNvSpPr txBox="1"/>
+          <p:nvPr/>
+        </p:nvSpPr>
+        <p:spPr>
+          <a:xfrm>
+            <a:off x="298579" y="728752"/>
+            <a:ext cx="3607053" cy="369332"/>
+          </a:xfrm>
+          <a:prstGeom prst="rect">
+            <a:avLst/>
+          </a:prstGeom>
+          <a:noFill/>
+        </p:spPr>
+        <p:txBody>
+          <a:bodyPr wrap="square" rtlCol="0">
+            <a:spAutoFit/>
+          </a:bodyPr>
+          <a:lstStyle/>
+          <a:p>
+            <a:r>
+              <a:rPr lang="en-US" dirty="0"/>
+              <a:t>Different MCTS variations:</a:t>
+            </a:r>
+          </a:p>
+        </p:txBody>
+      </p:sp>
+      <p:sp>
+        <p:nvSpPr>
+          <p:cNvPr id="14" name="TextBox 13">
+            <a:extLst>
+              <a:ext uri="{FF2B5EF4-FFF2-40B4-BE49-F238E27FC236}">
+                <a16:creationId xmlns:a16="http://schemas.microsoft.com/office/drawing/2014/main" id="{98C36839-4ACD-4B97-8391-835246893FC0}"/>
+              </a:ext>
+            </a:extLst>
+          </p:cNvPr>
+          <p:cNvSpPr txBox="1"/>
+          <p:nvPr/>
+        </p:nvSpPr>
+        <p:spPr>
+          <a:xfrm>
+            <a:off x="370368" y="3933500"/>
+            <a:ext cx="3607053" cy="461665"/>
+          </a:xfrm>
+          <a:prstGeom prst="rect">
+            <a:avLst/>
+          </a:prstGeom>
+          <a:noFill/>
+        </p:spPr>
+        <p:txBody>
+          <a:bodyPr wrap="square" rtlCol="0">
+            <a:spAutoFit/>
+          </a:bodyPr>
+          <a:lstStyle/>
+          <a:p>
+            <a:r>
+              <a:rPr lang="en-US" sz="2400" b="1" dirty="0"/>
+              <a:t>Others</a:t>
+            </a:r>
+          </a:p>
+        </p:txBody>
+      </p:sp>
+      <p:pic>
+        <p:nvPicPr>
+          <p:cNvPr id="18" name="Picture 17">
+            <a:extLst>
+              <a:ext uri="{FF2B5EF4-FFF2-40B4-BE49-F238E27FC236}">
+                <a16:creationId xmlns:a16="http://schemas.microsoft.com/office/drawing/2014/main" id="{DA99B19B-4A0E-4BAB-B4BC-6C9371BBFA6F}"/>
+              </a:ext>
+            </a:extLst>
+          </p:cNvPr>
+          <p:cNvPicPr>
+            <a:picLocks noChangeAspect="1"/>
+          </p:cNvPicPr>
+          <p:nvPr/>
+        </p:nvPicPr>
+        <p:blipFill>
+          <a:blip r:embed="rId5">
+            <a:extLst>
+              <a:ext uri="{28A0092B-C50C-407E-A947-70E740481C1C}">
+                <a14:useLocalDpi xmlns:a14="http://schemas.microsoft.com/office/drawing/2010/main" val="0"/>
+              </a:ext>
+            </a:extLst>
+          </a:blip>
+          <a:stretch>
+            <a:fillRect/>
+          </a:stretch>
+        </p:blipFill>
+        <p:spPr>
+          <a:xfrm>
+            <a:off x="1764049" y="4540818"/>
+            <a:ext cx="3238774" cy="2242228"/>
+          </a:xfrm>
+          <a:prstGeom prst="rect">
+            <a:avLst/>
+          </a:prstGeom>
+        </p:spPr>
+      </p:pic>
+      <p:sp>
+        <p:nvSpPr>
+          <p:cNvPr id="19" name="TextBox 18">
+            <a:extLst>
+              <a:ext uri="{FF2B5EF4-FFF2-40B4-BE49-F238E27FC236}">
+                <a16:creationId xmlns:a16="http://schemas.microsoft.com/office/drawing/2014/main" id="{E4901FBB-0928-4676-A091-43880D844110}"/>
+              </a:ext>
+            </a:extLst>
+          </p:cNvPr>
+          <p:cNvSpPr txBox="1"/>
+          <p:nvPr/>
+        </p:nvSpPr>
+        <p:spPr>
+          <a:xfrm>
+            <a:off x="1764050" y="4141232"/>
+            <a:ext cx="3238774" cy="369332"/>
+          </a:xfrm>
+          <a:prstGeom prst="rect">
+            <a:avLst/>
+          </a:prstGeom>
+          <a:noFill/>
+        </p:spPr>
+        <p:txBody>
+          <a:bodyPr wrap="square" rtlCol="0">
+            <a:spAutoFit/>
+          </a:bodyPr>
+          <a:lstStyle/>
+          <a:p>
+            <a:pPr algn="ctr"/>
+            <a:r>
+              <a:rPr lang="en-US" dirty="0"/>
+              <a:t>Random</a:t>
+            </a:r>
+          </a:p>
+        </p:txBody>
+      </p:sp>
+      <p:sp>
+        <p:nvSpPr>
+          <p:cNvPr id="20" name="TextBox 19">
+            <a:extLst>
+              <a:ext uri="{FF2B5EF4-FFF2-40B4-BE49-F238E27FC236}">
+                <a16:creationId xmlns:a16="http://schemas.microsoft.com/office/drawing/2014/main" id="{FE29109A-54C2-41B5-B536-C658373175B6}"/>
+              </a:ext>
+            </a:extLst>
+          </p:cNvPr>
+          <p:cNvSpPr txBox="1"/>
+          <p:nvPr/>
+        </p:nvSpPr>
+        <p:spPr>
+          <a:xfrm>
+            <a:off x="6595194" y="4075587"/>
+            <a:ext cx="3238774" cy="369332"/>
+          </a:xfrm>
+          <a:prstGeom prst="rect">
+            <a:avLst/>
+          </a:prstGeom>
+          <a:noFill/>
+        </p:spPr>
+        <p:txBody>
+          <a:bodyPr wrap="square" rtlCol="0">
+            <a:spAutoFit/>
+          </a:bodyPr>
+          <a:lstStyle/>
+          <a:p>
+            <a:pPr algn="ctr"/>
+            <a:r>
+              <a:rPr lang="en-US" dirty="0"/>
+              <a:t>OSLA(One Step Look Ahead)</a:t>
+            </a:r>
+          </a:p>
+        </p:txBody>
+      </p:sp>
+      <p:pic>
+        <p:nvPicPr>
+          <p:cNvPr id="22" name="Picture 21">
+            <a:extLst>
+              <a:ext uri="{FF2B5EF4-FFF2-40B4-BE49-F238E27FC236}">
+                <a16:creationId xmlns:a16="http://schemas.microsoft.com/office/drawing/2014/main" id="{AB951F74-8989-400C-AD0D-EB7D2CCE7E8E}"/>
+              </a:ext>
+            </a:extLst>
+          </p:cNvPr>
+          <p:cNvPicPr>
+            <a:picLocks noChangeAspect="1"/>
+          </p:cNvPicPr>
+          <p:nvPr/>
+        </p:nvPicPr>
+        <p:blipFill>
+          <a:blip r:embed="rId6">
+            <a:extLst>
+              <a:ext uri="{28A0092B-C50C-407E-A947-70E740481C1C}">
+                <a14:useLocalDpi xmlns:a14="http://schemas.microsoft.com/office/drawing/2010/main" val="0"/>
+              </a:ext>
+            </a:extLst>
+          </a:blip>
+          <a:stretch>
+            <a:fillRect/>
+          </a:stretch>
+        </p:blipFill>
+        <p:spPr>
+          <a:xfrm>
+            <a:off x="6724512" y="4540818"/>
+            <a:ext cx="3238774" cy="2242229"/>
+          </a:xfrm>
+          <a:prstGeom prst="rect">
+            <a:avLst/>
+          </a:prstGeom>
+        </p:spPr>
+      </p:pic>
     </p:spTree>
     <p:extLst>
       <p:ext uri="{BB962C8B-B14F-4D97-AF65-F5344CB8AC3E}">
@@ -4205,12 +4522,48 @@
           <a:chExt cx="0" cy="0"/>
         </a:xfrm>
       </p:grpSpPr>
-      <p:sp>
-        <p:nvSpPr>
-          <p:cNvPr id="4" name="TextBox 3">
-            <a:extLst>
-              <a:ext uri="{FF2B5EF4-FFF2-40B4-BE49-F238E27FC236}">
-                <a16:creationId xmlns:a16="http://schemas.microsoft.com/office/drawing/2014/main" id="{0D421A23-4C62-4BA8-BC69-FD7475CCFB27}"/>
+      <p:pic>
+        <p:nvPicPr>
+          <p:cNvPr id="7" name="Picture 6">
+            <a:extLst>
+              <a:ext uri="{FF2B5EF4-FFF2-40B4-BE49-F238E27FC236}">
+                <a16:creationId xmlns:a16="http://schemas.microsoft.com/office/drawing/2014/main" id="{30C4C06C-A57F-4D51-9D46-7A716E264E60}"/>
+              </a:ext>
+            </a:extLst>
+          </p:cNvPr>
+          <p:cNvPicPr>
+            <a:picLocks noChangeAspect="1"/>
+          </p:cNvPicPr>
+          <p:nvPr/>
+        </p:nvPicPr>
+        <p:blipFill>
+          <a:blip r:embed="rId2">
+            <a:extLst>
+              <a:ext uri="{28A0092B-C50C-407E-A947-70E740481C1C}">
+                <a14:useLocalDpi xmlns:a14="http://schemas.microsoft.com/office/drawing/2010/main" val="0"/>
+              </a:ext>
+            </a:extLst>
+          </a:blip>
+          <a:stretch>
+            <a:fillRect/>
+          </a:stretch>
+        </p:blipFill>
+        <p:spPr>
+          <a:xfrm>
+            <a:off x="1127614" y="1943100"/>
+            <a:ext cx="3959225" cy="2741002"/>
+          </a:xfrm>
+          <a:prstGeom prst="rect">
+            <a:avLst/>
+          </a:prstGeom>
+        </p:spPr>
+      </p:pic>
+      <p:sp>
+        <p:nvSpPr>
+          <p:cNvPr id="8" name="TextBox 7">
+            <a:extLst>
+              <a:ext uri="{FF2B5EF4-FFF2-40B4-BE49-F238E27FC236}">
+                <a16:creationId xmlns:a16="http://schemas.microsoft.com/office/drawing/2014/main" id="{29446C98-7362-4E61-8F46-FB66422410D2}"/>
               </a:ext>
             </a:extLst>
           </p:cNvPr>
@@ -4219,8 +4572,8 @@
         </p:nvSpPr>
         <p:spPr>
           <a:xfrm>
-            <a:off x="298579" y="230157"/>
-            <a:ext cx="7564017" cy="369332"/>
+            <a:off x="1091340" y="6025280"/>
+            <a:ext cx="3607053" cy="369332"/>
           </a:xfrm>
           <a:prstGeom prst="rect">
             <a:avLst/>
@@ -4235,16 +4588,50 @@
           <a:p>
             <a:r>
               <a:rPr lang="en-US" dirty="0"/>
-              <a:t>How have you analyzed and interpreted these results?</a:t>
-            </a:r>
-            <a:endParaRPr lang="en-GB" dirty="0"/>
+              <a:t>Random controller after 10 Games</a:t>
+            </a:r>
+          </a:p>
+        </p:txBody>
+      </p:sp>
+      <p:sp>
+        <p:nvSpPr>
+          <p:cNvPr id="9" name="TextBox 8">
+            <a:extLst>
+              <a:ext uri="{FF2B5EF4-FFF2-40B4-BE49-F238E27FC236}">
+                <a16:creationId xmlns:a16="http://schemas.microsoft.com/office/drawing/2014/main" id="{79FFED36-85A3-48DB-91A0-280C3BBAD323}"/>
+              </a:ext>
+            </a:extLst>
+          </p:cNvPr>
+          <p:cNvSpPr txBox="1"/>
+          <p:nvPr/>
+        </p:nvSpPr>
+        <p:spPr>
+          <a:xfrm>
+            <a:off x="7782291" y="5851412"/>
+            <a:ext cx="3165232" cy="369332"/>
+          </a:xfrm>
+          <a:prstGeom prst="rect">
+            <a:avLst/>
+          </a:prstGeom>
+          <a:noFill/>
+        </p:spPr>
+        <p:txBody>
+          <a:bodyPr wrap="square" rtlCol="0">
+            <a:spAutoFit/>
+          </a:bodyPr>
+          <a:lstStyle/>
+          <a:p>
+            <a:r>
+              <a:rPr lang="en-US" dirty="0"/>
+              <a:t>MCTS controller after 10 Games</a:t>
+            </a:r>
           </a:p>
         </p:txBody>
       </p:sp>
     </p:spTree>
     <p:extLst>
       <p:ext uri="{BB962C8B-B14F-4D97-AF65-F5344CB8AC3E}">
-        <p14:creationId xmlns:p14="http://schemas.microsoft.com/office/powerpoint/2010/main" val="376911726"/>
+        <p14:creationId xmlns:p14="http://schemas.microsoft.com/office/powerpoint/2010/main" val="1236290162"/>
       </p:ext>
     </p:extLst>
   </p:cSld>
@@ -4301,6 +4688,72 @@
           <a:p>
             <a:r>
               <a:rPr lang="en-US" dirty="0"/>
+              <a:t>How have you analyzed and interpreted these results?</a:t>
+            </a:r>
+            <a:endParaRPr lang="en-GB" dirty="0"/>
+          </a:p>
+        </p:txBody>
+      </p:sp>
+    </p:spTree>
+    <p:extLst>
+      <p:ext uri="{BB962C8B-B14F-4D97-AF65-F5344CB8AC3E}">
+        <p14:creationId xmlns:p14="http://schemas.microsoft.com/office/powerpoint/2010/main" val="376911726"/>
+      </p:ext>
+    </p:extLst>
+  </p:cSld>
+  <p:clrMapOvr>
+    <a:masterClrMapping/>
+  </p:clrMapOvr>
+</p:sld>
+</file>
+
+<file path=ppt/slides/slide8.xml><?xml version="1.0" encoding="utf-8"?>
+<p:sld xmlns:a="http://schemas.openxmlformats.org/drawingml/2006/main" xmlns:r="http://schemas.openxmlformats.org/officeDocument/2006/relationships" xmlns:p="http://schemas.openxmlformats.org/presentationml/2006/main">
+  <p:cSld>
+    <p:spTree>
+      <p:nvGrpSpPr>
+        <p:cNvPr id="1" name=""/>
+        <p:cNvGrpSpPr/>
+        <p:nvPr/>
+      </p:nvGrpSpPr>
+      <p:grpSpPr>
+        <a:xfrm>
+          <a:off x="0" y="0"/>
+          <a:ext cx="0" cy="0"/>
+          <a:chOff x="0" y="0"/>
+          <a:chExt cx="0" cy="0"/>
+        </a:xfrm>
+      </p:grpSpPr>
+      <p:sp>
+        <p:nvSpPr>
+          <p:cNvPr id="4" name="TextBox 3">
+            <a:extLst>
+              <a:ext uri="{FF2B5EF4-FFF2-40B4-BE49-F238E27FC236}">
+                <a16:creationId xmlns:a16="http://schemas.microsoft.com/office/drawing/2014/main" id="{0D421A23-4C62-4BA8-BC69-FD7475CCFB27}"/>
+              </a:ext>
+            </a:extLst>
+          </p:cNvPr>
+          <p:cNvSpPr txBox="1"/>
+          <p:nvPr/>
+        </p:nvSpPr>
+        <p:spPr>
+          <a:xfrm>
+            <a:off x="298579" y="230157"/>
+            <a:ext cx="7564017" cy="369332"/>
+          </a:xfrm>
+          <a:prstGeom prst="rect">
+            <a:avLst/>
+          </a:prstGeom>
+          <a:noFill/>
+        </p:spPr>
+        <p:txBody>
+          <a:bodyPr wrap="square" rtlCol="0">
+            <a:spAutoFit/>
+          </a:bodyPr>
+          <a:lstStyle/>
+          <a:p>
+            <a:r>
+              <a:rPr lang="en-US" dirty="0"/>
               <a:t>What are you likely to conclude on the basis of this research?</a:t>
             </a:r>
             <a:endParaRPr lang="en-GB" dirty="0"/>
@@ -4320,7 +4773,7 @@
 </p:sld>
 </file>
 
-<file path=ppt/slides/slide8.xml><?xml version="1.0" encoding="utf-8"?>
+<file path=ppt/slides/slide9.xml><?xml version="1.0" encoding="utf-8"?>
 <p:sld xmlns:a="http://schemas.openxmlformats.org/drawingml/2006/main" xmlns:r="http://schemas.openxmlformats.org/officeDocument/2006/relationships" xmlns:p="http://schemas.openxmlformats.org/presentationml/2006/main">
   <p:cSld>
     <p:spTree>

</xml_diff>

<commit_message>
Updated R history and tried to get some more graphs
</commit_message>
<xml_diff>
--- a/Presentations/Findings Presentation/Findings.pptx
+++ b/Presentations/Findings Presentation/Findings.pptx
@@ -3370,7 +3370,7 @@
         <p:spPr>
           <a:xfrm>
             <a:off x="298579" y="230157"/>
-            <a:ext cx="7564017" cy="646331"/>
+            <a:ext cx="7564017" cy="369332"/>
           </a:xfrm>
           <a:prstGeom prst="rect">
             <a:avLst/>
@@ -3385,7 +3385,7 @@
           <a:p>
             <a:r>
               <a:rPr lang="en-US" dirty="0"/>
-              <a:t>What is (are) the key research question(s) that you will seek to answer in your project? </a:t>
+              <a:t>Project Research Questions:</a:t>
             </a:r>
             <a:endParaRPr lang="en-GB" dirty="0"/>
           </a:p>
@@ -3405,8 +3405,8 @@
         </p:nvSpPr>
         <p:spPr>
           <a:xfrm>
-            <a:off x="298579" y="1198736"/>
-            <a:ext cx="9075576" cy="1200329"/>
+            <a:off x="298579" y="912597"/>
+            <a:ext cx="9075576" cy="1477328"/>
           </a:xfrm>
           <a:prstGeom prst="rect">
             <a:avLst/>
@@ -3444,7 +3444,17 @@
             </a:pPr>
             <a:r>
               <a:rPr lang="en-GB" dirty="0"/>
-              <a:t>What are the best proposed methods of improving their limitations for this competition </a:t>
+              <a:t>What are the best proposed methods of improving their limitations for this competition</a:t>
+            </a:r>
+          </a:p>
+          <a:p>
+            <a:pPr marL="285750" indent="-285750">
+              <a:buFont typeface="Arial" panose="020B0604020202020204" pitchFamily="34" charset="0"/>
+              <a:buChar char="•"/>
+            </a:pPr>
+            <a:r>
+              <a:rPr lang="en-GB" dirty="0"/>
+              <a:t>Which MCTS modifications prove to be the best for </a:t>
             </a:r>
           </a:p>
         </p:txBody>
@@ -3463,8 +3473,8 @@
         </p:nvSpPr>
         <p:spPr>
           <a:xfrm>
-            <a:off x="175487" y="5227121"/>
-            <a:ext cx="9075576" cy="1200329"/>
+            <a:off x="298579" y="4782101"/>
+            <a:ext cx="9075576" cy="1754326"/>
           </a:xfrm>
           <a:prstGeom prst="rect">
             <a:avLst/>
@@ -3497,6 +3507,18 @@
               <a:t>What is the most effective modification to MCTS</a:t>
             </a:r>
           </a:p>
+          <a:p>
+            <a:r>
+              <a:rPr lang="en-GB" dirty="0"/>
+              <a:t>Benchmarking MCTS variants for GVG-AI</a:t>
+            </a:r>
+          </a:p>
+          <a:p>
+            <a:r>
+              <a:rPr lang="en-GB" dirty="0"/>
+              <a:t>Does any modifications to MCTS </a:t>
+            </a:r>
+          </a:p>
         </p:txBody>
       </p:sp>
       <p:sp>
@@ -3513,7 +3535,7 @@
         </p:nvSpPr>
         <p:spPr>
           <a:xfrm>
-            <a:off x="298579" y="2828835"/>
+            <a:off x="298579" y="2708849"/>
             <a:ext cx="9075576" cy="1477328"/>
           </a:xfrm>
           <a:prstGeom prst="rect">
@@ -3592,7 +3614,7 @@
         <p:spPr>
           <a:xfrm>
             <a:off x="263410" y="220083"/>
-            <a:ext cx="9075576" cy="1477328"/>
+            <a:ext cx="9075576" cy="923330"/>
           </a:xfrm>
           <a:prstGeom prst="rect">
             <a:avLst/>
@@ -3613,6 +3635,35 @@
           <a:p>
             <a:endParaRPr lang="en-US" dirty="0"/>
           </a:p>
+        </p:txBody>
+      </p:sp>
+      <p:sp>
+        <p:nvSpPr>
+          <p:cNvPr id="5" name="TextBox 4">
+            <a:extLst>
+              <a:ext uri="{FF2B5EF4-FFF2-40B4-BE49-F238E27FC236}">
+                <a16:creationId xmlns:a16="http://schemas.microsoft.com/office/drawing/2014/main" id="{18D3A235-65E9-43D6-B80C-6CB81816A0A6}"/>
+              </a:ext>
+            </a:extLst>
+          </p:cNvPr>
+          <p:cNvSpPr txBox="1"/>
+          <p:nvPr/>
+        </p:nvSpPr>
+        <p:spPr>
+          <a:xfrm>
+            <a:off x="263410" y="2429883"/>
+            <a:ext cx="9075576" cy="2308324"/>
+          </a:xfrm>
+          <a:prstGeom prst="rect">
+            <a:avLst/>
+          </a:prstGeom>
+          <a:noFill/>
+        </p:spPr>
+        <p:txBody>
+          <a:bodyPr wrap="square" rtlCol="0">
+            <a:spAutoFit/>
+          </a:bodyPr>
+          <a:lstStyle/>
           <a:p>
             <a:pPr marL="285750" indent="-285750">
               <a:buFont typeface="Arial" panose="020B0604020202020204" pitchFamily="34" charset="0"/>
@@ -3620,39 +3671,13 @@
             </a:pPr>
             <a:r>
               <a:rPr lang="en-US" dirty="0"/>
-              <a:t>This research will help gather knowledge into the limitations of different game tree search techniques for AI.</a:t>
-            </a:r>
-            <a:endParaRPr lang="en-GB" dirty="0"/>
-          </a:p>
-        </p:txBody>
-      </p:sp>
-      <p:sp>
-        <p:nvSpPr>
-          <p:cNvPr id="5" name="TextBox 4">
-            <a:extLst>
-              <a:ext uri="{FF2B5EF4-FFF2-40B4-BE49-F238E27FC236}">
-                <a16:creationId xmlns:a16="http://schemas.microsoft.com/office/drawing/2014/main" id="{18D3A235-65E9-43D6-B80C-6CB81816A0A6}"/>
-              </a:ext>
-            </a:extLst>
-          </p:cNvPr>
-          <p:cNvSpPr txBox="1"/>
-          <p:nvPr/>
-        </p:nvSpPr>
-        <p:spPr>
-          <a:xfrm>
-            <a:off x="263410" y="2429883"/>
-            <a:ext cx="9075576" cy="1754326"/>
-          </a:xfrm>
-          <a:prstGeom prst="rect">
-            <a:avLst/>
-          </a:prstGeom>
-          <a:noFill/>
-        </p:spPr>
-        <p:txBody>
-          <a:bodyPr wrap="square" rtlCol="0">
-            <a:spAutoFit/>
-          </a:bodyPr>
-          <a:lstStyle/>
+              <a:t>This research will help gather knowledge into the limitations of different game tree search techniques for </a:t>
+            </a:r>
+            <a:r>
+              <a:rPr lang="en-US"/>
+              <a:t>AI.</a:t>
+            </a:r>
+          </a:p>
           <a:p>
             <a:pPr marL="285750" indent="-285750">
               <a:buFont typeface="Arial" panose="020B0604020202020204" pitchFamily="34" charset="0"/>
@@ -3845,7 +3870,7 @@
         </p:blipFill>
         <p:spPr>
           <a:xfrm>
-            <a:off x="7275487" y="1692312"/>
+            <a:off x="1419268" y="1794628"/>
             <a:ext cx="4251230" cy="1437190"/>
           </a:xfrm>
           <a:prstGeom prst="rect">
@@ -3881,115 +3906,8 @@
         </p:blipFill>
         <p:spPr>
           <a:xfrm>
-            <a:off x="7442539" y="3164056"/>
+            <a:off x="5983016" y="634043"/>
             <a:ext cx="4251230" cy="1437190"/>
-          </a:xfrm>
-          <a:prstGeom prst="rect">
-            <a:avLst/>
-          </a:prstGeom>
-        </p:spPr>
-      </p:pic>
-      <p:pic>
-        <p:nvPicPr>
-          <p:cNvPr id="8" name="Picture 7">
-            <a:extLst>
-              <a:ext uri="{FF2B5EF4-FFF2-40B4-BE49-F238E27FC236}">
-                <a16:creationId xmlns:a16="http://schemas.microsoft.com/office/drawing/2014/main" id="{CE6845B2-998D-49A6-8C6D-E6ADF187677D}"/>
-              </a:ext>
-            </a:extLst>
-          </p:cNvPr>
-          <p:cNvPicPr>
-            <a:picLocks noChangeAspect="1"/>
-          </p:cNvPicPr>
-          <p:nvPr/>
-        </p:nvPicPr>
-        <p:blipFill>
-          <a:blip r:embed="rId4">
-            <a:extLst>
-              <a:ext uri="{28A0092B-C50C-407E-A947-70E740481C1C}">
-                <a14:useLocalDpi xmlns:a14="http://schemas.microsoft.com/office/drawing/2010/main" val="0"/>
-              </a:ext>
-            </a:extLst>
-          </a:blip>
-          <a:stretch>
-            <a:fillRect/>
-          </a:stretch>
-        </p:blipFill>
-        <p:spPr>
-          <a:xfrm>
-            <a:off x="498231" y="3164056"/>
-            <a:ext cx="4175045" cy="2890416"/>
-          </a:xfrm>
-          <a:prstGeom prst="rect">
-            <a:avLst/>
-          </a:prstGeom>
-        </p:spPr>
-      </p:pic>
-      <p:sp>
-        <p:nvSpPr>
-          <p:cNvPr id="9" name="TextBox 8">
-            <a:extLst>
-              <a:ext uri="{FF2B5EF4-FFF2-40B4-BE49-F238E27FC236}">
-                <a16:creationId xmlns:a16="http://schemas.microsoft.com/office/drawing/2014/main" id="{D101D859-425D-4DB4-9169-08E18CFA6AC8}"/>
-              </a:ext>
-            </a:extLst>
-          </p:cNvPr>
-          <p:cNvSpPr txBox="1"/>
-          <p:nvPr/>
-        </p:nvSpPr>
-        <p:spPr>
-          <a:xfrm>
-            <a:off x="498231" y="2760170"/>
-            <a:ext cx="1877245" cy="369332"/>
-          </a:xfrm>
-          <a:prstGeom prst="rect">
-            <a:avLst/>
-          </a:prstGeom>
-          <a:noFill/>
-        </p:spPr>
-        <p:txBody>
-          <a:bodyPr wrap="none" rtlCol="0">
-            <a:spAutoFit/>
-          </a:bodyPr>
-          <a:lstStyle/>
-          <a:p>
-            <a:r>
-              <a:rPr lang="en-GB" dirty="0"/>
-              <a:t>One game played:</a:t>
-            </a:r>
-          </a:p>
-        </p:txBody>
-      </p:sp>
-      <p:pic>
-        <p:nvPicPr>
-          <p:cNvPr id="11" name="Picture 10">
-            <a:extLst>
-              <a:ext uri="{FF2B5EF4-FFF2-40B4-BE49-F238E27FC236}">
-                <a16:creationId xmlns:a16="http://schemas.microsoft.com/office/drawing/2014/main" id="{51D833BB-F252-4D74-95AA-0C3EFAB9D18E}"/>
-              </a:ext>
-            </a:extLst>
-          </p:cNvPr>
-          <p:cNvPicPr>
-            <a:picLocks noChangeAspect="1"/>
-          </p:cNvPicPr>
-          <p:nvPr/>
-        </p:nvPicPr>
-        <p:blipFill>
-          <a:blip r:embed="rId5">
-            <a:extLst>
-              <a:ext uri="{28A0092B-C50C-407E-A947-70E740481C1C}">
-                <a14:useLocalDpi xmlns:a14="http://schemas.microsoft.com/office/drawing/2010/main" val="0"/>
-              </a:ext>
-            </a:extLst>
-          </a:blip>
-          <a:stretch>
-            <a:fillRect/>
-          </a:stretch>
-        </p:blipFill>
-        <p:spPr>
-          <a:xfrm>
-            <a:off x="4999556" y="3129502"/>
-            <a:ext cx="3968598" cy="2913881"/>
           </a:xfrm>
           <a:prstGeom prst="rect">
             <a:avLst/>

</xml_diff>